<commit_message>
update megafon course project: final version
</commit_message>
<xml_diff>
--- a/megafon/final_project/final_project_magafon_presentation.pptx
+++ b/megafon/final_project/final_project_magafon_presentation.pptx
@@ -4231,7 +4231,7 @@
         <p:spPr>
           <a:xfrm>
             <a:off x="1143000" y="1828800"/>
-            <a:ext cx="7622831" cy="3970318"/>
+            <a:ext cx="7622831" cy="4247317"/>
           </a:xfrm>
           <a:prstGeom prst="rect">
             <a:avLst/>
@@ -4441,6 +4441,18 @@
               <a:rPr lang="ru-RU" dirty="0"/>
               <a:t> и сохранение для прогноза</a:t>
             </a:r>
+            <a:endParaRPr lang="en-US" dirty="0"/>
+          </a:p>
+          <a:p>
+            <a:pPr marL="228600" indent="-108000" defTabSz="720000">
+              <a:buFont typeface="+mj-lt"/>
+              <a:buAutoNum type="arabicPeriod" startAt="6"/>
+            </a:pPr>
+            <a:r>
+              <a:rPr lang="ru-RU" dirty="0"/>
+              <a:t>Формирование индивидуальных предсказаний для абонентов</a:t>
+            </a:r>
+            <a:endParaRPr lang="en-US" dirty="0"/>
           </a:p>
         </p:txBody>
       </p:sp>
@@ -6792,7 +6804,7 @@
         <p:spPr>
           <a:xfrm>
             <a:off x="401580" y="2660062"/>
-            <a:ext cx="5161019" cy="936154"/>
+            <a:ext cx="5161019" cy="689932"/>
           </a:xfrm>
           <a:prstGeom prst="rect">
             <a:avLst/>
@@ -6813,13 +6825,13 @@
               </a:spcBef>
             </a:pPr>
             <a:r>
-              <a:rPr lang="ru-RU" sz="6000" b="1" spc="335" dirty="0">
+              <a:rPr lang="ru-RU" sz="4400" b="1" spc="335" dirty="0">
                 <a:latin typeface="Arial"/>
                 <a:cs typeface="Arial"/>
               </a:rPr>
-              <a:t>Исходники</a:t>
-            </a:r>
-            <a:endParaRPr sz="6000" dirty="0">
+              <a:t>Ссылки</a:t>
+            </a:r>
+            <a:endParaRPr sz="4400" dirty="0">
               <a:latin typeface="Arial"/>
               <a:cs typeface="Arial"/>
             </a:endParaRPr>
@@ -6834,8 +6846,8 @@
         </p:nvSpPr>
         <p:spPr>
           <a:xfrm>
-            <a:off x="448862" y="3909197"/>
-            <a:ext cx="1998980" cy="641350"/>
+            <a:off x="530091" y="3657600"/>
+            <a:ext cx="1608538" cy="285719"/>
           </a:xfrm>
           <a:prstGeom prst="rect">
             <a:avLst/>
@@ -6856,164 +6868,60 @@
               </a:spcBef>
             </a:pPr>
             <a:r>
-              <a:rPr sz="1400" spc="10" dirty="0">
-                <a:latin typeface="Trebuchet MS"/>
-                <a:cs typeface="Trebuchet MS"/>
-                <a:hlinkClick r:id="rId2"/>
+              <a:rPr lang="en-US" sz="1400" dirty="0" err="1">
+                <a:solidFill>
+                  <a:srgbClr val="0070C0"/>
+                </a:solidFill>
+                <a:latin typeface="Arial"/>
+                <a:cs typeface="Arial"/>
+                <a:hlinkClick r:id="rId2">
+                  <a:extLst>
+                    <a:ext uri="{A12FA001-AC4F-418D-AE19-62706E023703}">
+                      <ahyp:hlinkClr xmlns:ahyp="http://schemas.microsoft.com/office/drawing/2018/hyperlinkcolor" val="tx"/>
+                    </a:ext>
+                  </a:extLst>
+                </a:hlinkClick>
               </a:rPr>
-              <a:t>e</a:t>
-            </a:r>
-            <a:r>
-              <a:rPr sz="1400" spc="20" dirty="0">
-                <a:latin typeface="Trebuchet MS"/>
-                <a:cs typeface="Trebuchet MS"/>
-                <a:hlinkClick r:id="rId2"/>
-              </a:rPr>
-              <a:t>v</a:t>
-            </a:r>
-            <a:r>
-              <a:rPr sz="1400" spc="10" dirty="0">
-                <a:latin typeface="Trebuchet MS"/>
-                <a:cs typeface="Trebuchet MS"/>
-                <a:hlinkClick r:id="rId2"/>
-              </a:rPr>
-              <a:t>en</a:t>
-            </a:r>
-            <a:r>
-              <a:rPr sz="1400" spc="20" dirty="0">
-                <a:latin typeface="Trebuchet MS"/>
-                <a:cs typeface="Trebuchet MS"/>
-                <a:hlinkClick r:id="rId2"/>
-              </a:rPr>
-              <a:t>t</a:t>
-            </a:r>
-            <a:r>
-              <a:rPr sz="1400" spc="-75" dirty="0">
-                <a:latin typeface="Trebuchet MS"/>
-                <a:cs typeface="Trebuchet MS"/>
-                <a:hlinkClick r:id="rId2"/>
-              </a:rPr>
-              <a:t>.</a:t>
-            </a:r>
-            <a:r>
-              <a:rPr sz="1400" spc="75" dirty="0">
-                <a:latin typeface="Trebuchet MS"/>
-                <a:cs typeface="Trebuchet MS"/>
-                <a:hlinkClick r:id="rId2"/>
-              </a:rPr>
-              <a:t>b</a:t>
-            </a:r>
-            <a:r>
-              <a:rPr sz="1400" spc="100" dirty="0">
-                <a:latin typeface="Trebuchet MS"/>
-                <a:cs typeface="Trebuchet MS"/>
-                <a:hlinkClick r:id="rId2"/>
-              </a:rPr>
-              <a:t>2</a:t>
-            </a:r>
-            <a:r>
-              <a:rPr sz="1400" spc="75" dirty="0">
-                <a:latin typeface="Trebuchet MS"/>
-                <a:cs typeface="Trebuchet MS"/>
-                <a:hlinkClick r:id="rId2"/>
-              </a:rPr>
-              <a:t>b</a:t>
-            </a:r>
-            <a:r>
-              <a:rPr sz="1400" spc="200" dirty="0">
-                <a:latin typeface="Trebuchet MS"/>
-                <a:cs typeface="Trebuchet MS"/>
-                <a:hlinkClick r:id="rId2"/>
-              </a:rPr>
-              <a:t>@</a:t>
-            </a:r>
-            <a:r>
-              <a:rPr sz="1400" spc="35" dirty="0">
-                <a:latin typeface="Trebuchet MS"/>
-                <a:cs typeface="Trebuchet MS"/>
-                <a:hlinkClick r:id="rId2"/>
-              </a:rPr>
-              <a:t>m</a:t>
-            </a:r>
-            <a:r>
-              <a:rPr sz="1400" spc="80" dirty="0">
-                <a:latin typeface="Trebuchet MS"/>
-                <a:cs typeface="Trebuchet MS"/>
-                <a:hlinkClick r:id="rId2"/>
-              </a:rPr>
-              <a:t>e</a:t>
-            </a:r>
-            <a:r>
-              <a:rPr sz="1400" spc="75" dirty="0">
-                <a:latin typeface="Trebuchet MS"/>
-                <a:cs typeface="Trebuchet MS"/>
-                <a:hlinkClick r:id="rId2"/>
-              </a:rPr>
-              <a:t>g</a:t>
-            </a:r>
-            <a:r>
-              <a:rPr sz="1400" spc="120" dirty="0">
-                <a:latin typeface="Trebuchet MS"/>
-                <a:cs typeface="Trebuchet MS"/>
-                <a:hlinkClick r:id="rId2"/>
-              </a:rPr>
-              <a:t>a</a:t>
-            </a:r>
-            <a:r>
-              <a:rPr sz="1400" spc="-5" dirty="0">
-                <a:latin typeface="Trebuchet MS"/>
-                <a:cs typeface="Trebuchet MS"/>
-                <a:hlinkClick r:id="rId2"/>
-              </a:rPr>
-              <a:t>f</a:t>
-            </a:r>
-            <a:r>
-              <a:rPr sz="1400" spc="10" dirty="0">
-                <a:latin typeface="Trebuchet MS"/>
-                <a:cs typeface="Trebuchet MS"/>
-                <a:hlinkClick r:id="rId2"/>
-              </a:rPr>
-              <a:t>on</a:t>
-            </a:r>
-            <a:r>
-              <a:rPr sz="1400" spc="15" dirty="0">
-                <a:latin typeface="Trebuchet MS"/>
-                <a:cs typeface="Trebuchet MS"/>
-                <a:hlinkClick r:id="rId2"/>
-              </a:rPr>
-              <a:t>.</a:t>
-            </a:r>
-            <a:r>
-              <a:rPr sz="1400" spc="-10" dirty="0">
-                <a:latin typeface="Trebuchet MS"/>
-                <a:cs typeface="Trebuchet MS"/>
-                <a:hlinkClick r:id="rId2"/>
-              </a:rPr>
-              <a:t>r</a:t>
-            </a:r>
-            <a:r>
-              <a:rPr sz="1400" spc="15" dirty="0">
-                <a:latin typeface="Trebuchet MS"/>
-                <a:cs typeface="Trebuchet MS"/>
-                <a:hlinkClick r:id="rId2"/>
-              </a:rPr>
-              <a:t>u </a:t>
-            </a:r>
-            <a:r>
-              <a:rPr sz="1400" spc="10" dirty="0">
-                <a:latin typeface="Trebuchet MS"/>
-                <a:cs typeface="Trebuchet MS"/>
+              <a:t>github</a:t>
+            </a:r>
+            <a:r>
+              <a:rPr lang="en-US" sz="1400" dirty="0">
+                <a:solidFill>
+                  <a:srgbClr val="0070C0"/>
+                </a:solidFill>
+                <a:latin typeface="Arial"/>
+                <a:cs typeface="Arial"/>
+                <a:hlinkClick r:id="rId2">
+                  <a:extLst>
+                    <a:ext uri="{A12FA001-AC4F-418D-AE19-62706E023703}">
+                      <ahyp:hlinkClr xmlns:ahyp="http://schemas.microsoft.com/office/drawing/2018/hyperlinkcolor" val="tx"/>
+                    </a:ext>
+                  </a:extLst>
+                </a:hlinkClick>
               </a:rPr>
               <a:t> </a:t>
             </a:r>
             <a:r>
-              <a:rPr sz="1400" spc="20" dirty="0">
+              <a:rPr lang="ru-RU" sz="1400" dirty="0">
+                <a:solidFill>
+                  <a:srgbClr val="0070C0"/>
+                </a:solidFill>
                 <a:latin typeface="Arial"/>
                 <a:cs typeface="Arial"/>
+                <a:hlinkClick r:id="rId2">
+                  <a:extLst>
+                    <a:ext uri="{A12FA001-AC4F-418D-AE19-62706E023703}">
+                      <ahyp:hlinkClr xmlns:ahyp="http://schemas.microsoft.com/office/drawing/2018/hyperlinkcolor" val="tx"/>
+                    </a:ext>
+                  </a:extLst>
+                </a:hlinkClick>
               </a:rPr>
-              <a:t>b2b.megafon.ru</a:t>
-            </a:r>
-            <a:endParaRPr sz="1400">
+              <a:t>проекта</a:t>
+            </a:r>
+            <a:endParaRPr sz="1400" dirty="0">
+              <a:solidFill>
+                <a:srgbClr val="0070C0"/>
+              </a:solidFill>
               <a:latin typeface="Arial"/>
               <a:cs typeface="Arial"/>
             </a:endParaRPr>

</xml_diff>